<commit_message>
kinetics and lab meeting
</commit_message>
<xml_diff>
--- a/Presentation/General Kinetics Overview.pptx
+++ b/Presentation/General Kinetics Overview.pptx
@@ -7,6 +7,8 @@
   <p:sldIdLst>
     <p:sldId id="256" r:id="rId2"/>
     <p:sldId id="257" r:id="rId3"/>
+    <p:sldId id="258" r:id="rId4"/>
+    <p:sldId id="259" r:id="rId5"/>
   </p:sldIdLst>
   <p:sldSz cx="12192000" cy="6858000"/>
   <p:notesSz cx="6858000" cy="9144000"/>
@@ -105,6 +107,11 @@
       </a:defRPr>
     </a:lvl9pPr>
   </p:defaultTextStyle>
+  <p:extLst>
+    <p:ext uri="{EFAFB233-063F-42B5-8137-9DF3F51BA10A}">
+      <p15:sldGuideLst xmlns:p15="http://schemas.microsoft.com/office/powerpoint/2012/main"/>
+    </p:ext>
+  </p:extLst>
 </p:presentation>
 </file>
 
@@ -255,7 +262,7 @@
           <a:p>
             <a:fld id="{D0D32F19-F778-44C2-A243-96501EB3D3C9}" type="datetimeFigureOut">
               <a:rPr lang="en-US" smtClean="0"/>
-              <a:t>1/5/2024</a:t>
+              <a:t>1/10/2024</a:t>
             </a:fld>
             <a:endParaRPr lang="en-US"/>
           </a:p>
@@ -453,7 +460,7 @@
           <a:p>
             <a:fld id="{D0D32F19-F778-44C2-A243-96501EB3D3C9}" type="datetimeFigureOut">
               <a:rPr lang="en-US" smtClean="0"/>
-              <a:t>1/5/2024</a:t>
+              <a:t>1/10/2024</a:t>
             </a:fld>
             <a:endParaRPr lang="en-US"/>
           </a:p>
@@ -661,7 +668,7 @@
           <a:p>
             <a:fld id="{D0D32F19-F778-44C2-A243-96501EB3D3C9}" type="datetimeFigureOut">
               <a:rPr lang="en-US" smtClean="0"/>
-              <a:t>1/5/2024</a:t>
+              <a:t>1/10/2024</a:t>
             </a:fld>
             <a:endParaRPr lang="en-US"/>
           </a:p>
@@ -859,7 +866,7 @@
           <a:p>
             <a:fld id="{D0D32F19-F778-44C2-A243-96501EB3D3C9}" type="datetimeFigureOut">
               <a:rPr lang="en-US" smtClean="0"/>
-              <a:t>1/5/2024</a:t>
+              <a:t>1/10/2024</a:t>
             </a:fld>
             <a:endParaRPr lang="en-US"/>
           </a:p>
@@ -1134,7 +1141,7 @@
           <a:p>
             <a:fld id="{D0D32F19-F778-44C2-A243-96501EB3D3C9}" type="datetimeFigureOut">
               <a:rPr lang="en-US" smtClean="0"/>
-              <a:t>1/5/2024</a:t>
+              <a:t>1/10/2024</a:t>
             </a:fld>
             <a:endParaRPr lang="en-US"/>
           </a:p>
@@ -1399,7 +1406,7 @@
           <a:p>
             <a:fld id="{D0D32F19-F778-44C2-A243-96501EB3D3C9}" type="datetimeFigureOut">
               <a:rPr lang="en-US" smtClean="0"/>
-              <a:t>1/5/2024</a:t>
+              <a:t>1/10/2024</a:t>
             </a:fld>
             <a:endParaRPr lang="en-US"/>
           </a:p>
@@ -1811,7 +1818,7 @@
           <a:p>
             <a:fld id="{D0D32F19-F778-44C2-A243-96501EB3D3C9}" type="datetimeFigureOut">
               <a:rPr lang="en-US" smtClean="0"/>
-              <a:t>1/5/2024</a:t>
+              <a:t>1/10/2024</a:t>
             </a:fld>
             <a:endParaRPr lang="en-US"/>
           </a:p>
@@ -1952,7 +1959,7 @@
           <a:p>
             <a:fld id="{D0D32F19-F778-44C2-A243-96501EB3D3C9}" type="datetimeFigureOut">
               <a:rPr lang="en-US" smtClean="0"/>
-              <a:t>1/5/2024</a:t>
+              <a:t>1/10/2024</a:t>
             </a:fld>
             <a:endParaRPr lang="en-US"/>
           </a:p>
@@ -2065,7 +2072,7 @@
           <a:p>
             <a:fld id="{D0D32F19-F778-44C2-A243-96501EB3D3C9}" type="datetimeFigureOut">
               <a:rPr lang="en-US" smtClean="0"/>
-              <a:t>1/5/2024</a:t>
+              <a:t>1/10/2024</a:t>
             </a:fld>
             <a:endParaRPr lang="en-US"/>
           </a:p>
@@ -2376,7 +2383,7 @@
           <a:p>
             <a:fld id="{D0D32F19-F778-44C2-A243-96501EB3D3C9}" type="datetimeFigureOut">
               <a:rPr lang="en-US" smtClean="0"/>
-              <a:t>1/5/2024</a:t>
+              <a:t>1/10/2024</a:t>
             </a:fld>
             <a:endParaRPr lang="en-US"/>
           </a:p>
@@ -2664,7 +2671,7 @@
           <a:p>
             <a:fld id="{D0D32F19-F778-44C2-A243-96501EB3D3C9}" type="datetimeFigureOut">
               <a:rPr lang="en-US" smtClean="0"/>
-              <a:t>1/5/2024</a:t>
+              <a:t>1/10/2024</a:t>
             </a:fld>
             <a:endParaRPr lang="en-US"/>
           </a:p>
@@ -2905,7 +2912,7 @@
           <a:p>
             <a:fld id="{D0D32F19-F778-44C2-A243-96501EB3D3C9}" type="datetimeFigureOut">
               <a:rPr lang="en-US" smtClean="0"/>
-              <a:t>1/5/2024</a:t>
+              <a:t>1/10/2024</a:t>
             </a:fld>
             <a:endParaRPr lang="en-US"/>
           </a:p>
@@ -3544,7 +3551,7 @@
             </a:pPr>
             <a:r>
               <a:rPr lang="en-US" dirty="0"/>
-              <a:t>pH (6.8, 7.4, 8.0)</a:t>
+              <a:t>pH (6.5, 7.4, 8.0) Expand range. </a:t>
             </a:r>
           </a:p>
           <a:p>
@@ -3554,7 +3561,7 @@
             </a:pPr>
             <a:r>
               <a:rPr lang="en-US" dirty="0"/>
-              <a:t>Ionic Strength (173mM, 90mM, 31mM) </a:t>
+              <a:t>Ionic Strength (175mM, 90mM, 40mM) </a:t>
             </a:r>
           </a:p>
           <a:p>
@@ -3629,6 +3636,397 @@
     <p:extLst>
       <p:ext uri="{BB962C8B-B14F-4D97-AF65-F5344CB8AC3E}">
         <p14:creationId xmlns:p14="http://schemas.microsoft.com/office/powerpoint/2010/main" val="3765894932"/>
+      </p:ext>
+    </p:extLst>
+  </p:cSld>
+  <p:clrMapOvr>
+    <a:masterClrMapping/>
+  </p:clrMapOvr>
+</p:sld>
+</file>
+
+<file path=ppt/slides/slide3.xml><?xml version="1.0" encoding="utf-8"?>
+<p:sld xmlns:a="http://schemas.openxmlformats.org/drawingml/2006/main" xmlns:r="http://schemas.openxmlformats.org/officeDocument/2006/relationships" xmlns:p="http://schemas.openxmlformats.org/presentationml/2006/main">
+  <p:cSld>
+    <p:spTree>
+      <p:nvGrpSpPr>
+        <p:cNvPr id="1" name=""/>
+        <p:cNvGrpSpPr/>
+        <p:nvPr/>
+      </p:nvGrpSpPr>
+      <p:grpSpPr>
+        <a:xfrm>
+          <a:off x="0" y="0"/>
+          <a:ext cx="0" cy="0"/>
+          <a:chOff x="0" y="0"/>
+          <a:chExt cx="0" cy="0"/>
+        </a:xfrm>
+      </p:grpSpPr>
+      <p:sp>
+        <p:nvSpPr>
+          <p:cNvPr id="2" name="Title 1">
+            <a:extLst>
+              <a:ext uri="{FF2B5EF4-FFF2-40B4-BE49-F238E27FC236}">
+                <a16:creationId xmlns:a16="http://schemas.microsoft.com/office/drawing/2014/main" id="{3AA6D8E6-D2AF-0E87-014A-164FFC11603A}"/>
+              </a:ext>
+            </a:extLst>
+          </p:cNvPr>
+          <p:cNvSpPr>
+            <a:spLocks noGrp="1"/>
+          </p:cNvSpPr>
+          <p:nvPr>
+            <p:ph type="title"/>
+          </p:nvPr>
+        </p:nvSpPr>
+        <p:spPr>
+          <a:xfrm>
+            <a:off x="159190" y="108971"/>
+            <a:ext cx="10515600" cy="612649"/>
+          </a:xfrm>
+        </p:spPr>
+        <p:txBody>
+          <a:bodyPr>
+            <a:normAutofit fontScale="90000"/>
+          </a:bodyPr>
+          <a:lstStyle/>
+          <a:p>
+            <a:r>
+              <a:rPr lang="en-US" dirty="0"/>
+              <a:t>Buffer Formulation</a:t>
+            </a:r>
+          </a:p>
+        </p:txBody>
+      </p:sp>
+      <p:pic>
+        <p:nvPicPr>
+          <p:cNvPr id="5" name="Picture 4">
+            <a:extLst>
+              <a:ext uri="{FF2B5EF4-FFF2-40B4-BE49-F238E27FC236}">
+                <a16:creationId xmlns:a16="http://schemas.microsoft.com/office/drawing/2014/main" id="{13BB05A8-4CE7-85D6-EC96-20FC0C508496}"/>
+              </a:ext>
+            </a:extLst>
+          </p:cNvPr>
+          <p:cNvPicPr>
+            <a:picLocks noChangeAspect="1"/>
+          </p:cNvPicPr>
+          <p:nvPr/>
+        </p:nvPicPr>
+        <p:blipFill>
+          <a:blip r:embed="rId2"/>
+          <a:stretch>
+            <a:fillRect/>
+          </a:stretch>
+        </p:blipFill>
+        <p:spPr>
+          <a:xfrm>
+            <a:off x="232197" y="1647956"/>
+            <a:ext cx="3100185" cy="1563525"/>
+          </a:xfrm>
+          <a:prstGeom prst="rect">
+            <a:avLst/>
+          </a:prstGeom>
+        </p:spPr>
+      </p:pic>
+      <p:pic>
+        <p:nvPicPr>
+          <p:cNvPr id="9" name="Picture 8">
+            <a:extLst>
+              <a:ext uri="{FF2B5EF4-FFF2-40B4-BE49-F238E27FC236}">
+                <a16:creationId xmlns:a16="http://schemas.microsoft.com/office/drawing/2014/main" id="{FD21224D-BC56-7D53-5008-5C8A31BC1737}"/>
+              </a:ext>
+            </a:extLst>
+          </p:cNvPr>
+          <p:cNvPicPr>
+            <a:picLocks noChangeAspect="1"/>
+          </p:cNvPicPr>
+          <p:nvPr/>
+        </p:nvPicPr>
+        <p:blipFill>
+          <a:blip r:embed="rId3"/>
+          <a:stretch>
+            <a:fillRect/>
+          </a:stretch>
+        </p:blipFill>
+        <p:spPr>
+          <a:xfrm>
+            <a:off x="8231454" y="1528636"/>
+            <a:ext cx="3069160" cy="2509210"/>
+          </a:xfrm>
+          <a:prstGeom prst="rect">
+            <a:avLst/>
+          </a:prstGeom>
+        </p:spPr>
+      </p:pic>
+      <p:sp>
+        <p:nvSpPr>
+          <p:cNvPr id="10" name="TextBox 9">
+            <a:extLst>
+              <a:ext uri="{FF2B5EF4-FFF2-40B4-BE49-F238E27FC236}">
+                <a16:creationId xmlns:a16="http://schemas.microsoft.com/office/drawing/2014/main" id="{9837BD53-C8E8-7773-E851-F8CD1F0B6AE7}"/>
+              </a:ext>
+            </a:extLst>
+          </p:cNvPr>
+          <p:cNvSpPr txBox="1"/>
+          <p:nvPr/>
+        </p:nvSpPr>
+        <p:spPr>
+          <a:xfrm>
+            <a:off x="296636" y="1093958"/>
+            <a:ext cx="3144387" cy="369332"/>
+          </a:xfrm>
+          <a:prstGeom prst="rect">
+            <a:avLst/>
+          </a:prstGeom>
+          <a:noFill/>
+        </p:spPr>
+        <p:txBody>
+          <a:bodyPr wrap="none" rtlCol="0">
+            <a:spAutoFit/>
+          </a:bodyPr>
+          <a:lstStyle/>
+          <a:p>
+            <a:r>
+              <a:rPr lang="en-US" b="1" u="sng" dirty="0"/>
+              <a:t>175mM Ionic Strength (1x PBS)</a:t>
+            </a:r>
+          </a:p>
+        </p:txBody>
+      </p:sp>
+      <p:sp>
+        <p:nvSpPr>
+          <p:cNvPr id="11" name="TextBox 10">
+            <a:extLst>
+              <a:ext uri="{FF2B5EF4-FFF2-40B4-BE49-F238E27FC236}">
+                <a16:creationId xmlns:a16="http://schemas.microsoft.com/office/drawing/2014/main" id="{041D2A78-8A32-4F84-85FE-BB890E3D0D9D}"/>
+              </a:ext>
+            </a:extLst>
+          </p:cNvPr>
+          <p:cNvSpPr txBox="1"/>
+          <p:nvPr/>
+        </p:nvSpPr>
+        <p:spPr>
+          <a:xfrm>
+            <a:off x="8273247" y="1093958"/>
+            <a:ext cx="3027367" cy="369332"/>
+          </a:xfrm>
+          <a:prstGeom prst="rect">
+            <a:avLst/>
+          </a:prstGeom>
+          <a:noFill/>
+        </p:spPr>
+        <p:txBody>
+          <a:bodyPr wrap="none" rtlCol="0">
+            <a:spAutoFit/>
+          </a:bodyPr>
+          <a:lstStyle/>
+          <a:p>
+            <a:r>
+              <a:rPr lang="en-US" b="1" u="sng" dirty="0"/>
+              <a:t>40mM Ionic Strength (1x PBS)</a:t>
+            </a:r>
+          </a:p>
+        </p:txBody>
+      </p:sp>
+      <p:pic>
+        <p:nvPicPr>
+          <p:cNvPr id="13" name="Picture 12">
+            <a:extLst>
+              <a:ext uri="{FF2B5EF4-FFF2-40B4-BE49-F238E27FC236}">
+                <a16:creationId xmlns:a16="http://schemas.microsoft.com/office/drawing/2014/main" id="{27A0A286-F3CF-FF5F-763C-53E023E7E61E}"/>
+              </a:ext>
+            </a:extLst>
+          </p:cNvPr>
+          <p:cNvPicPr>
+            <a:picLocks noChangeAspect="1"/>
+          </p:cNvPicPr>
+          <p:nvPr/>
+        </p:nvPicPr>
+        <p:blipFill>
+          <a:blip r:embed="rId4"/>
+          <a:stretch>
+            <a:fillRect/>
+          </a:stretch>
+        </p:blipFill>
+        <p:spPr>
+          <a:xfrm>
+            <a:off x="3960547" y="1463290"/>
+            <a:ext cx="3807505" cy="3165114"/>
+          </a:xfrm>
+          <a:prstGeom prst="rect">
+            <a:avLst/>
+          </a:prstGeom>
+        </p:spPr>
+      </p:pic>
+      <p:sp>
+        <p:nvSpPr>
+          <p:cNvPr id="14" name="TextBox 13">
+            <a:extLst>
+              <a:ext uri="{FF2B5EF4-FFF2-40B4-BE49-F238E27FC236}">
+                <a16:creationId xmlns:a16="http://schemas.microsoft.com/office/drawing/2014/main" id="{2CD16B8F-DC15-9321-CE4C-7A9EE134B963}"/>
+              </a:ext>
+            </a:extLst>
+          </p:cNvPr>
+          <p:cNvSpPr txBox="1"/>
+          <p:nvPr/>
+        </p:nvSpPr>
+        <p:spPr>
+          <a:xfrm>
+            <a:off x="4069188" y="1093958"/>
+            <a:ext cx="3027367" cy="369332"/>
+          </a:xfrm>
+          <a:prstGeom prst="rect">
+            <a:avLst/>
+          </a:prstGeom>
+          <a:noFill/>
+        </p:spPr>
+        <p:txBody>
+          <a:bodyPr wrap="none" rtlCol="0">
+            <a:spAutoFit/>
+          </a:bodyPr>
+          <a:lstStyle/>
+          <a:p>
+            <a:r>
+              <a:rPr lang="en-US" b="1" u="sng" dirty="0"/>
+              <a:t>90mM Ionic Strength (1x PBS)</a:t>
+            </a:r>
+          </a:p>
+        </p:txBody>
+      </p:sp>
+      <p:sp>
+        <p:nvSpPr>
+          <p:cNvPr id="15" name="TextBox 14">
+            <a:extLst>
+              <a:ext uri="{FF2B5EF4-FFF2-40B4-BE49-F238E27FC236}">
+                <a16:creationId xmlns:a16="http://schemas.microsoft.com/office/drawing/2014/main" id="{DD094ABB-F294-9149-59F3-67592C0BA585}"/>
+              </a:ext>
+            </a:extLst>
+          </p:cNvPr>
+          <p:cNvSpPr txBox="1"/>
+          <p:nvPr/>
+        </p:nvSpPr>
+        <p:spPr>
+          <a:xfrm>
+            <a:off x="1140737" y="5893806"/>
+            <a:ext cx="8477449" cy="369332"/>
+          </a:xfrm>
+          <a:prstGeom prst="rect">
+            <a:avLst/>
+          </a:prstGeom>
+          <a:noFill/>
+        </p:spPr>
+        <p:txBody>
+          <a:bodyPr wrap="none" rtlCol="0">
+            <a:spAutoFit/>
+          </a:bodyPr>
+          <a:lstStyle/>
+          <a:p>
+            <a:r>
+              <a:rPr lang="en-US" dirty="0"/>
+              <a:t>Do corrections for ionic strength differences via pH modulation? It’s the order of 10mM. </a:t>
+            </a:r>
+          </a:p>
+        </p:txBody>
+      </p:sp>
+    </p:spTree>
+    <p:extLst>
+      <p:ext uri="{BB962C8B-B14F-4D97-AF65-F5344CB8AC3E}">
+        <p14:creationId xmlns:p14="http://schemas.microsoft.com/office/powerpoint/2010/main" val="2059501557"/>
+      </p:ext>
+    </p:extLst>
+  </p:cSld>
+  <p:clrMapOvr>
+    <a:masterClrMapping/>
+  </p:clrMapOvr>
+</p:sld>
+</file>
+
+<file path=ppt/slides/slide4.xml><?xml version="1.0" encoding="utf-8"?>
+<p:sld xmlns:a="http://schemas.openxmlformats.org/drawingml/2006/main" xmlns:r="http://schemas.openxmlformats.org/officeDocument/2006/relationships" xmlns:p="http://schemas.openxmlformats.org/presentationml/2006/main">
+  <p:cSld>
+    <p:spTree>
+      <p:nvGrpSpPr>
+        <p:cNvPr id="1" name=""/>
+        <p:cNvGrpSpPr/>
+        <p:nvPr/>
+      </p:nvGrpSpPr>
+      <p:grpSpPr>
+        <a:xfrm>
+          <a:off x="0" y="0"/>
+          <a:ext cx="0" cy="0"/>
+          <a:chOff x="0" y="0"/>
+          <a:chExt cx="0" cy="0"/>
+        </a:xfrm>
+      </p:grpSpPr>
+      <p:sp>
+        <p:nvSpPr>
+          <p:cNvPr id="2" name="Title 1">
+            <a:extLst>
+              <a:ext uri="{FF2B5EF4-FFF2-40B4-BE49-F238E27FC236}">
+                <a16:creationId xmlns:a16="http://schemas.microsoft.com/office/drawing/2014/main" id="{9107C3FF-6697-79E3-4BCD-5774B4427531}"/>
+              </a:ext>
+            </a:extLst>
+          </p:cNvPr>
+          <p:cNvSpPr>
+            <a:spLocks noGrp="1"/>
+          </p:cNvSpPr>
+          <p:nvPr>
+            <p:ph type="title"/>
+          </p:nvPr>
+        </p:nvSpPr>
+        <p:spPr>
+          <a:xfrm>
+            <a:off x="0" y="-350099"/>
+            <a:ext cx="10515600" cy="1325563"/>
+          </a:xfrm>
+        </p:spPr>
+        <p:txBody>
+          <a:bodyPr/>
+          <a:lstStyle/>
+          <a:p>
+            <a:r>
+              <a:rPr lang="en-US" dirty="0"/>
+              <a:t>Controls</a:t>
+            </a:r>
+          </a:p>
+        </p:txBody>
+      </p:sp>
+      <p:sp>
+        <p:nvSpPr>
+          <p:cNvPr id="3" name="Content Placeholder 2">
+            <a:extLst>
+              <a:ext uri="{FF2B5EF4-FFF2-40B4-BE49-F238E27FC236}">
+                <a16:creationId xmlns:a16="http://schemas.microsoft.com/office/drawing/2014/main" id="{1CA175CB-283F-8E1F-16AA-F4F25921E673}"/>
+              </a:ext>
+            </a:extLst>
+          </p:cNvPr>
+          <p:cNvSpPr>
+            <a:spLocks noGrp="1"/>
+          </p:cNvSpPr>
+          <p:nvPr>
+            <p:ph idx="1"/>
+          </p:nvPr>
+        </p:nvSpPr>
+        <p:spPr>
+          <a:xfrm>
+            <a:off x="195404" y="911225"/>
+            <a:ext cx="10515600" cy="4351338"/>
+          </a:xfrm>
+        </p:spPr>
+        <p:txBody>
+          <a:bodyPr/>
+          <a:lstStyle/>
+          <a:p>
+            <a:r>
+              <a:rPr lang="en-US" dirty="0"/>
+              <a:t>Use range of pHs on fluorometer to graph intensity vs pH to adjust for altered fluorophore emission. </a:t>
+            </a:r>
+          </a:p>
+        </p:txBody>
+      </p:sp>
+    </p:spTree>
+    <p:extLst>
+      <p:ext uri="{BB962C8B-B14F-4D97-AF65-F5344CB8AC3E}">
+        <p14:creationId xmlns:p14="http://schemas.microsoft.com/office/powerpoint/2010/main" val="3175404585"/>
       </p:ext>
     </p:extLst>
   </p:cSld>

</xml_diff>